<commit_message>
Update The RISK of Markov Chains.pptx
</commit_message>
<xml_diff>
--- a/The RISK of Markov Chains.pptx
+++ b/The RISK of Markov Chains.pptx
@@ -12532,8 +12532,10 @@
               <a:t>Scripts: </a:t>
             </a:r>
             <a:r>
-              <a:rPr lang="en-US" dirty="0" err="1"/>
-              <a:t>github</a:t>
+              <a:rPr lang="en-US" dirty="0">
+                <a:hlinkClick r:id="rId4"/>
+              </a:rPr>
+              <a:t>https://github.com/ScriptlessFoe/RISK-battle-odds-calculator</a:t>
             </a:r>
             <a:endParaRPr lang="en-US" dirty="0"/>
           </a:p>

</xml_diff>